<commit_message>
Add demo selenium without maven
</commit_message>
<xml_diff>
--- a/documents/slides/selenium/Bai 1 - Gioi thieu ve automation test va selenium webdriver.pptx
+++ b/documents/slides/selenium/Bai 1 - Gioi thieu ve automation test va selenium webdriver.pptx
@@ -6609,31 +6609,43 @@
           <a:p>
             <a:r>
               <a:rPr lang="en-US" dirty="0"/>
-              <a:t>Java, Eclipse, </a:t>
-            </a:r>
-            <a:r>
-              <a:rPr lang="en-US" dirty="0" err="1"/>
-              <a:t>Git</a:t>
+              <a:t>Java, </a:t>
+            </a:r>
+            <a:r>
+              <a:rPr lang="en-US" dirty="0" err="1"/>
+              <a:t>Intellij</a:t>
+            </a:r>
+            <a:r>
+              <a:rPr lang="en-US" dirty="0"/>
+              <a:t> IDE, Git</a:t>
+            </a:r>
+          </a:p>
+          <a:p>
+            <a:r>
+              <a:rPr lang="en-US" dirty="0"/>
+              <a:t>Selenium libraries</a:t>
+            </a:r>
+          </a:p>
+          <a:p>
+            <a:r>
+              <a:rPr lang="en-US" dirty="0"/>
+              <a:t>Browser drivers for Firefox, Chrome, …</a:t>
+            </a:r>
+          </a:p>
+          <a:p>
+            <a:r>
+              <a:rPr lang="en-US" dirty="0"/>
+              <a:t>Run a test with </a:t>
+            </a:r>
+            <a:r>
+              <a:rPr lang="en-US" dirty="0" err="1"/>
+              <a:t>Intellij</a:t>
+            </a:r>
+            <a:r>
+              <a:rPr lang="en-US"/>
+              <a:t> IDE</a:t>
             </a:r>
             <a:endParaRPr lang="en-US" dirty="0"/>
-          </a:p>
-          <a:p>
-            <a:r>
-              <a:rPr lang="en-US" dirty="0"/>
-              <a:t>Selenium Driver</a:t>
-            </a:r>
-          </a:p>
-          <a:p>
-            <a:r>
-              <a:rPr lang="en-US" dirty="0"/>
-              <a:t>Browser drivers for Firefox, Chrome, …</a:t>
-            </a:r>
-          </a:p>
-          <a:p>
-            <a:r>
-              <a:rPr lang="en-US" dirty="0"/>
-              <a:t>Run a test with Eclipse</a:t>
-            </a:r>
           </a:p>
           <a:p>
             <a:pPr marL="0" indent="0">

</xml_diff>